<commit_message>
make 5 class and 6 class schedules
</commit_message>
<xml_diff>
--- a/00-Intro/L00-Intro.pptx
+++ b/00-Intro/L00-Intro.pptx
@@ -5,7 +5,7 @@
     <p:sldMasterId id="2147483660" r:id="rId1"/>
   </p:sldMasterIdLst>
   <p:notesMasterIdLst>
-    <p:notesMasterId r:id="rId12"/>
+    <p:notesMasterId r:id="rId13"/>
   </p:notesMasterIdLst>
   <p:sldIdLst>
     <p:sldId id="262" r:id="rId2"/>
@@ -16,8 +16,9 @@
     <p:sldId id="263" r:id="rId7"/>
     <p:sldId id="268" r:id="rId8"/>
     <p:sldId id="269" r:id="rId9"/>
-    <p:sldId id="266" r:id="rId10"/>
-    <p:sldId id="270" r:id="rId11"/>
+    <p:sldId id="271" r:id="rId10"/>
+    <p:sldId id="266" r:id="rId11"/>
+    <p:sldId id="270" r:id="rId12"/>
   </p:sldIdLst>
   <p:sldSz cx="12192000" cy="6858000"/>
   <p:notesSz cx="6858000" cy="9144000"/>
@@ -217,7 +218,7 @@
           <a:p>
             <a:fld id="{5FBB3532-E6E7-47FF-97C8-85EE7A0CBD49}" type="datetimeFigureOut">
               <a:rPr lang="en-US" smtClean="0"/>
-              <a:t>2023-04-17</a:t>
+              <a:t>2023-04-18</a:t>
             </a:fld>
             <a:endParaRPr lang="en-US"/>
           </a:p>
@@ -727,7 +728,7 @@
           <a:p>
             <a:fld id="{098A0168-EB40-45AF-89A1-87DE0A55FFC6}" type="datetime1">
               <a:rPr lang="en-US" smtClean="0"/>
-              <a:t>2023-04-17</a:t>
+              <a:t>2023-04-18</a:t>
             </a:fld>
             <a:endParaRPr lang="en-US"/>
           </a:p>
@@ -978,7 +979,7 @@
           <a:p>
             <a:fld id="{8F8CA68F-747D-436A-B5BB-2EBC3ED499E4}" type="datetime1">
               <a:rPr lang="en-US" smtClean="0"/>
-              <a:t>2023-04-17</a:t>
+              <a:t>2023-04-18</a:t>
             </a:fld>
             <a:endParaRPr lang="en-US"/>
           </a:p>
@@ -1188,7 +1189,7 @@
           <a:p>
             <a:fld id="{6DD8DC11-9E39-40A0-B3DC-E3F2AD04A616}" type="datetime1">
               <a:rPr lang="en-US" smtClean="0"/>
-              <a:t>2023-04-17</a:t>
+              <a:t>2023-04-18</a:t>
             </a:fld>
             <a:endParaRPr lang="en-US"/>
           </a:p>
@@ -1398,7 +1399,7 @@
           <a:p>
             <a:fld id="{BE0A88F0-556B-4BB7-8AAB-D63AEB65C662}" type="datetime1">
               <a:rPr lang="en-US" smtClean="0"/>
-              <a:t>2023-04-17</a:t>
+              <a:t>2023-04-18</a:t>
             </a:fld>
             <a:endParaRPr lang="en-US"/>
           </a:p>
@@ -1715,7 +1716,7 @@
           <a:p>
             <a:fld id="{60E05506-6815-4E0E-B1DE-ECA35C2016DF}" type="datetime1">
               <a:rPr lang="en-US" smtClean="0"/>
-              <a:t>2023-04-17</a:t>
+              <a:t>2023-04-18</a:t>
             </a:fld>
             <a:endParaRPr lang="en-US"/>
           </a:p>
@@ -1988,7 +1989,7 @@
           <a:p>
             <a:fld id="{FC6E85F7-A724-48A4-9D33-CEBC5174E865}" type="datetime1">
               <a:rPr lang="en-US" smtClean="0"/>
-              <a:t>2023-04-17</a:t>
+              <a:t>2023-04-18</a:t>
             </a:fld>
             <a:endParaRPr lang="en-US"/>
           </a:p>
@@ -2499,7 +2500,7 @@
           <a:p>
             <a:fld id="{42806E7A-BDD3-46A3-BEE2-EB821F9236B4}" type="datetime1">
               <a:rPr lang="en-US" smtClean="0"/>
-              <a:t>2023-04-17</a:t>
+              <a:t>2023-04-18</a:t>
             </a:fld>
             <a:endParaRPr lang="en-US"/>
           </a:p>
@@ -2732,7 +2733,7 @@
           <a:p>
             <a:fld id="{9ED1540C-9440-4E7A-B71A-BEFEE06869E3}" type="datetime1">
               <a:rPr lang="en-US" smtClean="0"/>
-              <a:t>2023-04-17</a:t>
+              <a:t>2023-04-18</a:t>
             </a:fld>
             <a:endParaRPr lang="en-US"/>
           </a:p>
@@ -2845,7 +2846,7 @@
           <a:p>
             <a:fld id="{E0318DDB-88AC-4039-B59C-B05DC4C9C16C}" type="datetime1">
               <a:rPr lang="en-US" smtClean="0"/>
-              <a:t>2023-04-17</a:t>
+              <a:t>2023-04-18</a:t>
             </a:fld>
             <a:endParaRPr lang="en-US"/>
           </a:p>
@@ -3160,7 +3161,7 @@
           <a:p>
             <a:fld id="{E082ABFB-60E7-4BA1-866A-7059F058065B}" type="datetime1">
               <a:rPr lang="en-US" smtClean="0"/>
-              <a:t>2023-04-17</a:t>
+              <a:t>2023-04-18</a:t>
             </a:fld>
             <a:endParaRPr lang="en-US"/>
           </a:p>
@@ -3452,7 +3453,7 @@
           <a:p>
             <a:fld id="{2694112F-55F4-4776-A323-7418930321C8}" type="datetime1">
               <a:rPr lang="en-US" smtClean="0"/>
-              <a:t>2023-04-17</a:t>
+              <a:t>2023-04-18</a:t>
             </a:fld>
             <a:endParaRPr lang="en-US"/>
           </a:p>
@@ -3747,7 +3748,7 @@
           <a:p>
             <a:fld id="{CFBEA57F-793F-4683-BD8A-741FD4B89154}" type="datetime1">
               <a:rPr lang="en-US" smtClean="0"/>
-              <a:t>2023-04-17</a:t>
+              <a:t>2023-04-18</a:t>
             </a:fld>
             <a:endParaRPr lang="en-US" dirty="0"/>
           </a:p>
@@ -4375,7 +4376,7 @@
           <a:p>
             <a:fld id="{098A0168-EB40-45AF-89A1-87DE0A55FFC6}" type="datetime1">
               <a:rPr lang="en-US" smtClean="0"/>
-              <a:t>2023-04-17</a:t>
+              <a:t>2023-04-18</a:t>
             </a:fld>
             <a:endParaRPr lang="en-US" dirty="0"/>
           </a:p>
@@ -4470,7 +4471,7 @@
           <p:cNvPr id="2" name="Title 1">
             <a:extLst>
               <a:ext uri="{FF2B5EF4-FFF2-40B4-BE49-F238E27FC236}">
-                <a16:creationId xmlns:a16="http://schemas.microsoft.com/office/drawing/2014/main" id="{F3D27326-8460-E1D2-ED62-CCC39AFB98BB}"/>
+                <a16:creationId xmlns:a16="http://schemas.microsoft.com/office/drawing/2014/main" id="{9196807D-3425-239C-C382-D5304E2F7199}"/>
               </a:ext>
             </a:extLst>
           </p:cNvPr>
@@ -4488,7 +4489,7 @@
           <a:p>
             <a:r>
               <a:rPr lang="en-US" dirty="0"/>
-              <a:t>New Course Structure and Goals</a:t>
+              <a:t>Schedule</a:t>
             </a:r>
           </a:p>
         </p:txBody>
@@ -4498,7 +4499,7 @@
           <p:cNvPr id="3" name="Content Placeholder 2">
             <a:extLst>
               <a:ext uri="{FF2B5EF4-FFF2-40B4-BE49-F238E27FC236}">
-                <a16:creationId xmlns:a16="http://schemas.microsoft.com/office/drawing/2014/main" id="{DC289EAC-EB0B-8817-05D1-BEC8ED2570B7}"/>
+                <a16:creationId xmlns:a16="http://schemas.microsoft.com/office/drawing/2014/main" id="{CE42CBB8-E0AB-D6F2-CFE0-20EB2E517E12}"/>
               </a:ext>
             </a:extLst>
           </p:cNvPr>
@@ -4509,52 +4510,60 @@
             <p:ph idx="1"/>
           </p:nvPr>
         </p:nvSpPr>
+        <p:spPr>
+          <a:xfrm>
+            <a:off x="838199" y="2108596"/>
+            <a:ext cx="9527275" cy="1936502"/>
+          </a:xfrm>
+        </p:spPr>
+        <p:txBody>
+          <a:bodyPr/>
+          <a:lstStyle/>
+          <a:p>
+            <a:r>
+              <a:rPr lang="en-US" dirty="0"/>
+              <a:t>Class: Tuesday 2-4 PM MST</a:t>
+            </a:r>
+          </a:p>
+          <a:p>
+            <a:r>
+              <a:rPr lang="en-US" dirty="0"/>
+              <a:t>Online writing hours: M-F 1-3 PM MST</a:t>
+            </a:r>
+          </a:p>
+          <a:p>
+            <a:pPr lvl="1"/>
+            <a:r>
+              <a:rPr lang="en-US" dirty="0"/>
+              <a:t>Discord</a:t>
+            </a:r>
+          </a:p>
+        </p:txBody>
+      </p:sp>
+      <p:sp>
+        <p:nvSpPr>
+          <p:cNvPr id="5" name="Date Placeholder 4">
+            <a:extLst>
+              <a:ext uri="{FF2B5EF4-FFF2-40B4-BE49-F238E27FC236}">
+                <a16:creationId xmlns:a16="http://schemas.microsoft.com/office/drawing/2014/main" id="{5DAD1E14-564F-0DAC-19B8-5EAB275E71AF}"/>
+              </a:ext>
+            </a:extLst>
+          </p:cNvPr>
+          <p:cNvSpPr>
+            <a:spLocks noGrp="1"/>
+          </p:cNvSpPr>
+          <p:nvPr>
+            <p:ph type="dt" sz="half" idx="10"/>
+          </p:nvPr>
+        </p:nvSpPr>
         <p:spPr/>
         <p:txBody>
           <a:bodyPr/>
           <a:lstStyle/>
           <a:p>
-            <a:r>
-              <a:rPr lang="en-US" dirty="0"/>
-              <a:t>Need your feedback throughout the process</a:t>
-            </a:r>
-          </a:p>
-          <a:p>
-            <a:r>
-              <a:rPr lang="en-US" dirty="0"/>
-              <a:t>Fist to five</a:t>
-            </a:r>
-            <a:r>
-              <a:rPr lang="en-US"/>
-              <a:t>, understanding</a:t>
-            </a:r>
-          </a:p>
-        </p:txBody>
-      </p:sp>
-      <p:sp>
-        <p:nvSpPr>
-          <p:cNvPr id="4" name="Date Placeholder 3">
-            <a:extLst>
-              <a:ext uri="{FF2B5EF4-FFF2-40B4-BE49-F238E27FC236}">
-                <a16:creationId xmlns:a16="http://schemas.microsoft.com/office/drawing/2014/main" id="{A020FE18-D571-F6D8-601B-A1127FE7E5DF}"/>
-              </a:ext>
-            </a:extLst>
-          </p:cNvPr>
-          <p:cNvSpPr>
-            <a:spLocks noGrp="1"/>
-          </p:cNvSpPr>
-          <p:nvPr>
-            <p:ph type="dt" sz="half" idx="10"/>
-          </p:nvPr>
-        </p:nvSpPr>
-        <p:spPr/>
-        <p:txBody>
-          <a:bodyPr/>
-          <a:lstStyle/>
-          <a:p>
-            <a:fld id="{BE0A88F0-556B-4BB7-8AAB-D63AEB65C662}" type="datetime1">
+            <a:fld id="{FC6E85F7-A724-48A4-9D33-CEBC5174E865}" type="datetime1">
               <a:rPr lang="en-US" smtClean="0"/>
-              <a:t>2023-04-17</a:t>
+              <a:t>2023-04-18</a:t>
             </a:fld>
             <a:endParaRPr lang="en-US"/>
           </a:p>
@@ -4562,10 +4571,10 @@
       </p:sp>
       <p:sp>
         <p:nvSpPr>
-          <p:cNvPr id="5" name="Footer Placeholder 4">
-            <a:extLst>
-              <a:ext uri="{FF2B5EF4-FFF2-40B4-BE49-F238E27FC236}">
-                <a16:creationId xmlns:a16="http://schemas.microsoft.com/office/drawing/2014/main" id="{A7251DB1-E98E-5192-2CB1-D4D8C096B166}"/>
+          <p:cNvPr id="6" name="Footer Placeholder 5">
+            <a:extLst>
+              <a:ext uri="{FF2B5EF4-FFF2-40B4-BE49-F238E27FC236}">
+                <a16:creationId xmlns:a16="http://schemas.microsoft.com/office/drawing/2014/main" id="{4D489174-0254-0D01-E256-C7054FFA020E}"/>
               </a:ext>
             </a:extLst>
           </p:cNvPr>
@@ -4587,10 +4596,10 @@
       </p:sp>
       <p:sp>
         <p:nvSpPr>
-          <p:cNvPr id="6" name="Slide Number Placeholder 5">
-            <a:extLst>
-              <a:ext uri="{FF2B5EF4-FFF2-40B4-BE49-F238E27FC236}">
-                <a16:creationId xmlns:a16="http://schemas.microsoft.com/office/drawing/2014/main" id="{D7A6630D-4D7A-796A-D243-F9D040930F1B}"/>
+          <p:cNvPr id="7" name="Slide Number Placeholder 6">
+            <a:extLst>
+              <a:ext uri="{FF2B5EF4-FFF2-40B4-BE49-F238E27FC236}">
+                <a16:creationId xmlns:a16="http://schemas.microsoft.com/office/drawing/2014/main" id="{DCC3C7CD-060C-EB6B-5FD0-B4CD31091566}"/>
               </a:ext>
             </a:extLst>
           </p:cNvPr>
@@ -4609,6 +4618,249 @@
             <a:fld id="{81D2C36F-4504-47C0-B82F-A167342A2754}" type="slidenum">
               <a:rPr lang="en-US" smtClean="0"/>
               <a:t>10</a:t>
+            </a:fld>
+            <a:endParaRPr lang="en-US"/>
+          </a:p>
+        </p:txBody>
+      </p:sp>
+      <p:graphicFrame>
+        <p:nvGraphicFramePr>
+          <p:cNvPr id="8" name="Content Placeholder 7">
+            <a:extLst>
+              <a:ext uri="{FF2B5EF4-FFF2-40B4-BE49-F238E27FC236}">
+                <a16:creationId xmlns:a16="http://schemas.microsoft.com/office/drawing/2014/main" id="{A218A5D3-706B-BCE0-30A7-C7331D26FA57}"/>
+              </a:ext>
+            </a:extLst>
+          </p:cNvPr>
+          <p:cNvGraphicFramePr>
+            <a:graphicFrameLocks noGrp="1" noChangeAspect="1"/>
+          </p:cNvGraphicFramePr>
+          <p:nvPr>
+            <p:ph sz="half" idx="4294967295"/>
+            <p:extLst>
+              <p:ext uri="{D42A27DB-BD31-4B8C-83A1-F6EECF244321}">
+                <p14:modId xmlns:p14="http://schemas.microsoft.com/office/powerpoint/2010/main" val="120814693"/>
+              </p:ext>
+            </p:extLst>
+          </p:nvPr>
+        </p:nvGraphicFramePr>
+        <p:xfrm>
+          <a:off x="800100" y="4168775"/>
+          <a:ext cx="9496425" cy="1736725"/>
+        </p:xfrm>
+        <a:graphic>
+          <a:graphicData uri="http://schemas.openxmlformats.org/presentationml/2006/ole">
+            <mc:AlternateContent xmlns:mc="http://schemas.openxmlformats.org/markup-compatibility/2006">
+              <mc:Choice xmlns:v="urn:schemas-microsoft-com:vml" Requires="v">
+                <p:oleObj name="Worksheet" r:id="rId2" imgW="10467885" imgH="1914564" progId="Excel.Sheet.12">
+                  <p:link updateAutomatic="1"/>
+                </p:oleObj>
+              </mc:Choice>
+              <mc:Fallback>
+                <p:oleObj name="Worksheet" r:id="rId2" imgW="10467885" imgH="1914564" progId="Excel.Sheet.12">
+                  <p:link updateAutomatic="1"/>
+                  <p:pic>
+                    <p:nvPicPr>
+                      <p:cNvPr id="0" name=""/>
+                      <p:cNvPicPr/>
+                      <p:nvPr/>
+                    </p:nvPicPr>
+                    <p:blipFill>
+                      <a:blip r:embed="rId3"/>
+                      <a:stretch>
+                        <a:fillRect/>
+                      </a:stretch>
+                    </p:blipFill>
+                    <p:spPr>
+                      <a:xfrm>
+                        <a:off x="800100" y="4168775"/>
+                        <a:ext cx="9496425" cy="1736725"/>
+                      </a:xfrm>
+                      <a:prstGeom prst="rect">
+                        <a:avLst/>
+                      </a:prstGeom>
+                    </p:spPr>
+                  </p:pic>
+                </p:oleObj>
+              </mc:Fallback>
+            </mc:AlternateContent>
+          </a:graphicData>
+        </a:graphic>
+      </p:graphicFrame>
+    </p:spTree>
+    <p:extLst>
+      <p:ext uri="{BB962C8B-B14F-4D97-AF65-F5344CB8AC3E}">
+        <p14:creationId xmlns:p14="http://schemas.microsoft.com/office/powerpoint/2010/main" val="3376932600"/>
+      </p:ext>
+    </p:extLst>
+  </p:cSld>
+  <p:clrMapOvr>
+    <a:masterClrMapping/>
+  </p:clrMapOvr>
+</p:sld>
+</file>
+
+<file path=ppt/slides/slide11.xml><?xml version="1.0" encoding="utf-8"?>
+<p:sld xmlns:a="http://schemas.openxmlformats.org/drawingml/2006/main" xmlns:r="http://schemas.openxmlformats.org/officeDocument/2006/relationships" xmlns:p="http://schemas.openxmlformats.org/presentationml/2006/main">
+  <p:cSld>
+    <p:spTree>
+      <p:nvGrpSpPr>
+        <p:cNvPr id="1" name=""/>
+        <p:cNvGrpSpPr/>
+        <p:nvPr/>
+      </p:nvGrpSpPr>
+      <p:grpSpPr>
+        <a:xfrm>
+          <a:off x="0" y="0"/>
+          <a:ext cx="0" cy="0"/>
+          <a:chOff x="0" y="0"/>
+          <a:chExt cx="0" cy="0"/>
+        </a:xfrm>
+      </p:grpSpPr>
+      <p:sp>
+        <p:nvSpPr>
+          <p:cNvPr id="2" name="Title 1">
+            <a:extLst>
+              <a:ext uri="{FF2B5EF4-FFF2-40B4-BE49-F238E27FC236}">
+                <a16:creationId xmlns:a16="http://schemas.microsoft.com/office/drawing/2014/main" id="{F3D27326-8460-E1D2-ED62-CCC39AFB98BB}"/>
+              </a:ext>
+            </a:extLst>
+          </p:cNvPr>
+          <p:cNvSpPr>
+            <a:spLocks noGrp="1"/>
+          </p:cNvSpPr>
+          <p:nvPr>
+            <p:ph type="title"/>
+          </p:nvPr>
+        </p:nvSpPr>
+        <p:spPr/>
+        <p:txBody>
+          <a:bodyPr/>
+          <a:lstStyle/>
+          <a:p>
+            <a:r>
+              <a:rPr lang="en-US" dirty="0"/>
+              <a:t>New Course Structure and Goals</a:t>
+            </a:r>
+          </a:p>
+        </p:txBody>
+      </p:sp>
+      <p:sp>
+        <p:nvSpPr>
+          <p:cNvPr id="3" name="Content Placeholder 2">
+            <a:extLst>
+              <a:ext uri="{FF2B5EF4-FFF2-40B4-BE49-F238E27FC236}">
+                <a16:creationId xmlns:a16="http://schemas.microsoft.com/office/drawing/2014/main" id="{DC289EAC-EB0B-8817-05D1-BEC8ED2570B7}"/>
+              </a:ext>
+            </a:extLst>
+          </p:cNvPr>
+          <p:cNvSpPr>
+            <a:spLocks noGrp="1"/>
+          </p:cNvSpPr>
+          <p:nvPr>
+            <p:ph idx="1"/>
+          </p:nvPr>
+        </p:nvSpPr>
+        <p:spPr/>
+        <p:txBody>
+          <a:bodyPr/>
+          <a:lstStyle/>
+          <a:p>
+            <a:r>
+              <a:rPr lang="en-US" dirty="0"/>
+              <a:t>Need your feedback throughout the process</a:t>
+            </a:r>
+          </a:p>
+          <a:p>
+            <a:r>
+              <a:rPr lang="en-US" dirty="0"/>
+              <a:t>Fist to five</a:t>
+            </a:r>
+            <a:r>
+              <a:rPr lang="en-US"/>
+              <a:t>, understanding</a:t>
+            </a:r>
+          </a:p>
+        </p:txBody>
+      </p:sp>
+      <p:sp>
+        <p:nvSpPr>
+          <p:cNvPr id="4" name="Date Placeholder 3">
+            <a:extLst>
+              <a:ext uri="{FF2B5EF4-FFF2-40B4-BE49-F238E27FC236}">
+                <a16:creationId xmlns:a16="http://schemas.microsoft.com/office/drawing/2014/main" id="{A020FE18-D571-F6D8-601B-A1127FE7E5DF}"/>
+              </a:ext>
+            </a:extLst>
+          </p:cNvPr>
+          <p:cNvSpPr>
+            <a:spLocks noGrp="1"/>
+          </p:cNvSpPr>
+          <p:nvPr>
+            <p:ph type="dt" sz="half" idx="10"/>
+          </p:nvPr>
+        </p:nvSpPr>
+        <p:spPr/>
+        <p:txBody>
+          <a:bodyPr/>
+          <a:lstStyle/>
+          <a:p>
+            <a:fld id="{BE0A88F0-556B-4BB7-8AAB-D63AEB65C662}" type="datetime1">
+              <a:rPr lang="en-US" smtClean="0"/>
+              <a:t>2023-04-18</a:t>
+            </a:fld>
+            <a:endParaRPr lang="en-US"/>
+          </a:p>
+        </p:txBody>
+      </p:sp>
+      <p:sp>
+        <p:nvSpPr>
+          <p:cNvPr id="5" name="Footer Placeholder 4">
+            <a:extLst>
+              <a:ext uri="{FF2B5EF4-FFF2-40B4-BE49-F238E27FC236}">
+                <a16:creationId xmlns:a16="http://schemas.microsoft.com/office/drawing/2014/main" id="{A7251DB1-E98E-5192-2CB1-D4D8C096B166}"/>
+              </a:ext>
+            </a:extLst>
+          </p:cNvPr>
+          <p:cNvSpPr>
+            <a:spLocks noGrp="1"/>
+          </p:cNvSpPr>
+          <p:nvPr>
+            <p:ph type="ftr" sz="quarter" idx="11"/>
+          </p:nvPr>
+        </p:nvSpPr>
+        <p:spPr/>
+        <p:txBody>
+          <a:bodyPr/>
+          <a:lstStyle/>
+          <a:p>
+            <a:endParaRPr lang="en-US"/>
+          </a:p>
+        </p:txBody>
+      </p:sp>
+      <p:sp>
+        <p:nvSpPr>
+          <p:cNvPr id="6" name="Slide Number Placeholder 5">
+            <a:extLst>
+              <a:ext uri="{FF2B5EF4-FFF2-40B4-BE49-F238E27FC236}">
+                <a16:creationId xmlns:a16="http://schemas.microsoft.com/office/drawing/2014/main" id="{D7A6630D-4D7A-796A-D243-F9D040930F1B}"/>
+              </a:ext>
+            </a:extLst>
+          </p:cNvPr>
+          <p:cNvSpPr>
+            <a:spLocks noGrp="1"/>
+          </p:cNvSpPr>
+          <p:nvPr>
+            <p:ph type="sldNum" sz="quarter" idx="12"/>
+          </p:nvPr>
+        </p:nvSpPr>
+        <p:spPr/>
+        <p:txBody>
+          <a:bodyPr/>
+          <a:lstStyle/>
+          <a:p>
+            <a:fld id="{81D2C36F-4504-47C0-B82F-A167342A2754}" type="slidenum">
+              <a:rPr lang="en-US" smtClean="0"/>
+              <a:t>11</a:t>
             </a:fld>
             <a:endParaRPr lang="en-US"/>
           </a:p>
@@ -5337,7 +5589,7 @@
                   <a:spcPts val="600"/>
                 </a:spcAft>
               </a:pPr>
-              <a:t>2023-04-17</a:t>
+              <a:t>2023-04-18</a:t>
             </a:fld>
             <a:endParaRPr lang="en-US"/>
           </a:p>
@@ -5793,7 +6045,7 @@
           <a:p>
             <a:fld id="{FC6E85F7-A724-48A4-9D33-CEBC5174E865}" type="datetime1">
               <a:rPr lang="en-US" smtClean="0"/>
-              <a:t>2023-04-17</a:t>
+              <a:t>2023-04-18</a:t>
             </a:fld>
             <a:endParaRPr lang="en-US"/>
           </a:p>
@@ -5974,7 +6226,7 @@
           <a:p>
             <a:fld id="{FC6E85F7-A724-48A4-9D33-CEBC5174E865}" type="datetime1">
               <a:rPr lang="en-US" smtClean="0"/>
-              <a:t>2023-04-17</a:t>
+              <a:t>2023-04-18</a:t>
             </a:fld>
             <a:endParaRPr lang="en-US"/>
           </a:p>
@@ -6772,7 +7024,7 @@
                   <a:spcPts val="600"/>
                 </a:spcAft>
               </a:pPr>
-              <a:t>2023-04-17</a:t>
+              <a:t>2023-04-18</a:t>
             </a:fld>
             <a:endParaRPr lang="en-US"/>
           </a:p>
@@ -7274,7 +7526,7 @@
           <a:p>
             <a:fld id="{FC6E85F7-A724-48A4-9D33-CEBC5174E865}" type="datetime1">
               <a:rPr lang="en-US" smtClean="0"/>
-              <a:t>2023-04-17</a:t>
+              <a:t>2023-04-18</a:t>
             </a:fld>
             <a:endParaRPr lang="en-US"/>
           </a:p>
@@ -7415,7 +7667,7 @@
           <a:p>
             <a:fld id="{FC6E85F7-A724-48A4-9D33-CEBC5174E865}" type="datetime1">
               <a:rPr lang="en-US" smtClean="0"/>
-              <a:t>2023-04-17</a:t>
+              <a:t>2023-04-18</a:t>
             </a:fld>
             <a:endParaRPr lang="en-US"/>
           </a:p>
@@ -8259,7 +8511,7 @@
                   <a:spcPts val="600"/>
                 </a:spcAft>
               </a:pPr>
-              <a:t>2023-04-17</a:t>
+              <a:t>2023-04-18</a:t>
             </a:fld>
             <a:endParaRPr lang="en-US"/>
           </a:p>
@@ -8569,7 +8821,7 @@
           <p:cNvPr id="2" name="Title 1">
             <a:extLst>
               <a:ext uri="{FF2B5EF4-FFF2-40B4-BE49-F238E27FC236}">
-                <a16:creationId xmlns:a16="http://schemas.microsoft.com/office/drawing/2014/main" id="{9196807D-3425-239C-C382-D5304E2F7199}"/>
+                <a16:creationId xmlns:a16="http://schemas.microsoft.com/office/drawing/2014/main" id="{DDF20FA9-C164-F262-7F5D-27B1897AF4A5}"/>
               </a:ext>
             </a:extLst>
           </p:cNvPr>
@@ -8587,7 +8839,7 @@
           <a:p>
             <a:r>
               <a:rPr lang="en-US" dirty="0"/>
-              <a:t>Schedule</a:t>
+              <a:t>How?</a:t>
             </a:r>
           </a:p>
         </p:txBody>
@@ -8597,44 +8849,51 @@
           <p:cNvPr id="3" name="Content Placeholder 2">
             <a:extLst>
               <a:ext uri="{FF2B5EF4-FFF2-40B4-BE49-F238E27FC236}">
-                <a16:creationId xmlns:a16="http://schemas.microsoft.com/office/drawing/2014/main" id="{CE42CBB8-E0AB-D6F2-CFE0-20EB2E517E12}"/>
-              </a:ext>
-            </a:extLst>
-          </p:cNvPr>
-          <p:cNvSpPr>
-            <a:spLocks noGrp="1"/>
-          </p:cNvSpPr>
-          <p:nvPr>
-            <p:ph idx="1"/>
-          </p:nvPr>
-        </p:nvSpPr>
-        <p:spPr>
-          <a:xfrm>
-            <a:off x="838199" y="2108596"/>
-            <a:ext cx="9527275" cy="1936502"/>
-          </a:xfrm>
-        </p:spPr>
+                <a16:creationId xmlns:a16="http://schemas.microsoft.com/office/drawing/2014/main" id="{D92E0518-C785-5ABC-0D22-E26CE1F89B4D}"/>
+              </a:ext>
+            </a:extLst>
+          </p:cNvPr>
+          <p:cNvSpPr>
+            <a:spLocks noGrp="1"/>
+          </p:cNvSpPr>
+          <p:nvPr>
+            <p:ph sz="half" idx="1"/>
+          </p:nvPr>
+        </p:nvSpPr>
+        <p:spPr/>
         <p:txBody>
           <a:bodyPr/>
           <a:lstStyle/>
           <a:p>
             <a:r>
               <a:rPr lang="en-US" dirty="0"/>
-              <a:t>Class: Tuesday 2-4 PM MST</a:t>
-            </a:r>
-          </a:p>
-          <a:p>
-            <a:r>
-              <a:rPr lang="en-US" dirty="0"/>
-              <a:t>Online writing hours: M-F 1-3 PM MST</a:t>
-            </a:r>
-          </a:p>
-          <a:p>
-            <a:pPr lvl="1"/>
-            <a:r>
-              <a:rPr lang="en-US" dirty="0"/>
-              <a:t>Discord</a:t>
-            </a:r>
+              <a:t>Groups of 3-5 will be reviewing each other’s work each week.</a:t>
+            </a:r>
+          </a:p>
+        </p:txBody>
+      </p:sp>
+      <p:sp>
+        <p:nvSpPr>
+          <p:cNvPr id="4" name="Content Placeholder 3">
+            <a:extLst>
+              <a:ext uri="{FF2B5EF4-FFF2-40B4-BE49-F238E27FC236}">
+                <a16:creationId xmlns:a16="http://schemas.microsoft.com/office/drawing/2014/main" id="{491CEA13-5B7C-48ED-4CE2-68B408AC41AC}"/>
+              </a:ext>
+            </a:extLst>
+          </p:cNvPr>
+          <p:cNvSpPr>
+            <a:spLocks noGrp="1"/>
+          </p:cNvSpPr>
+          <p:nvPr>
+            <p:ph sz="half" idx="2"/>
+          </p:nvPr>
+        </p:nvSpPr>
+        <p:spPr/>
+        <p:txBody>
+          <a:bodyPr/>
+          <a:lstStyle/>
+          <a:p>
+            <a:endParaRPr lang="en-US"/>
           </a:p>
         </p:txBody>
       </p:sp>
@@ -8643,7 +8902,7 @@
           <p:cNvPr id="5" name="Date Placeholder 4">
             <a:extLst>
               <a:ext uri="{FF2B5EF4-FFF2-40B4-BE49-F238E27FC236}">
-                <a16:creationId xmlns:a16="http://schemas.microsoft.com/office/drawing/2014/main" id="{5DAD1E14-564F-0DAC-19B8-5EAB275E71AF}"/>
+                <a16:creationId xmlns:a16="http://schemas.microsoft.com/office/drawing/2014/main" id="{E8D96E84-8FE6-7E34-8A3F-36BE87C643C9}"/>
               </a:ext>
             </a:extLst>
           </p:cNvPr>
@@ -8661,7 +8920,7 @@
           <a:p>
             <a:fld id="{FC6E85F7-A724-48A4-9D33-CEBC5174E865}" type="datetime1">
               <a:rPr lang="en-US" smtClean="0"/>
-              <a:t>2023-04-17</a:t>
+              <a:t>2023-04-18</a:t>
             </a:fld>
             <a:endParaRPr lang="en-US"/>
           </a:p>
@@ -8672,7 +8931,7 @@
           <p:cNvPr id="6" name="Footer Placeholder 5">
             <a:extLst>
               <a:ext uri="{FF2B5EF4-FFF2-40B4-BE49-F238E27FC236}">
-                <a16:creationId xmlns:a16="http://schemas.microsoft.com/office/drawing/2014/main" id="{4D489174-0254-0D01-E256-C7054FFA020E}"/>
+                <a16:creationId xmlns:a16="http://schemas.microsoft.com/office/drawing/2014/main" id="{BF65EB04-6192-AEF2-0565-2F6925FEB2CE}"/>
               </a:ext>
             </a:extLst>
           </p:cNvPr>
@@ -8697,7 +8956,7 @@
           <p:cNvPr id="7" name="Slide Number Placeholder 6">
             <a:extLst>
               <a:ext uri="{FF2B5EF4-FFF2-40B4-BE49-F238E27FC236}">
-                <a16:creationId xmlns:a16="http://schemas.microsoft.com/office/drawing/2014/main" id="{DCC3C7CD-060C-EB6B-5FD0-B4CD31091566}"/>
+                <a16:creationId xmlns:a16="http://schemas.microsoft.com/office/drawing/2014/main" id="{DAB84B19-84F7-2761-AE64-D99D8CB51CF6}"/>
               </a:ext>
             </a:extLst>
           </p:cNvPr>
@@ -8721,74 +8980,10 @@
           </a:p>
         </p:txBody>
       </p:sp>
-      <p:graphicFrame>
-        <p:nvGraphicFramePr>
-          <p:cNvPr id="8" name="Content Placeholder 7">
-            <a:extLst>
-              <a:ext uri="{FF2B5EF4-FFF2-40B4-BE49-F238E27FC236}">
-                <a16:creationId xmlns:a16="http://schemas.microsoft.com/office/drawing/2014/main" id="{A218A5D3-706B-BCE0-30A7-C7331D26FA57}"/>
-              </a:ext>
-            </a:extLst>
-          </p:cNvPr>
-          <p:cNvGraphicFramePr>
-            <a:graphicFrameLocks noGrp="1" noChangeAspect="1"/>
-          </p:cNvGraphicFramePr>
-          <p:nvPr>
-            <p:ph sz="half" idx="4294967295"/>
-            <p:extLst>
-              <p:ext uri="{D42A27DB-BD31-4B8C-83A1-F6EECF244321}">
-                <p14:modId xmlns:p14="http://schemas.microsoft.com/office/powerpoint/2010/main" val="3301344905"/>
-              </p:ext>
-            </p:extLst>
-          </p:nvPr>
-        </p:nvGraphicFramePr>
-        <p:xfrm>
-          <a:off x="646113" y="4168775"/>
-          <a:ext cx="9804400" cy="1736725"/>
-        </p:xfrm>
-        <a:graphic>
-          <a:graphicData uri="http://schemas.openxmlformats.org/presentationml/2006/ole">
-            <mc:AlternateContent xmlns:mc="http://schemas.openxmlformats.org/markup-compatibility/2006">
-              <mc:Choice xmlns:v="urn:schemas-microsoft-com:vml" Requires="v">
-                <p:oleObj name="Worksheet" r:id="rId2" imgW="8658171" imgH="1533667" progId="Excel.Sheet.12">
-                  <p:link updateAutomatic="1"/>
-                </p:oleObj>
-              </mc:Choice>
-              <mc:Fallback>
-                <p:oleObj name="Worksheet" r:id="rId2" imgW="8658171" imgH="1533667" progId="Excel.Sheet.12">
-                  <p:link updateAutomatic="1"/>
-                  <p:pic>
-                    <p:nvPicPr>
-                      <p:cNvPr id="0" name=""/>
-                      <p:cNvPicPr/>
-                      <p:nvPr/>
-                    </p:nvPicPr>
-                    <p:blipFill>
-                      <a:blip r:embed="rId3"/>
-                      <a:stretch>
-                        <a:fillRect/>
-                      </a:stretch>
-                    </p:blipFill>
-                    <p:spPr>
-                      <a:xfrm>
-                        <a:off x="646113" y="4168775"/>
-                        <a:ext cx="9804400" cy="1736725"/>
-                      </a:xfrm>
-                      <a:prstGeom prst="rect">
-                        <a:avLst/>
-                      </a:prstGeom>
-                    </p:spPr>
-                  </p:pic>
-                </p:oleObj>
-              </mc:Fallback>
-            </mc:AlternateContent>
-          </a:graphicData>
-        </a:graphic>
-      </p:graphicFrame>
     </p:spTree>
     <p:extLst>
       <p:ext uri="{BB962C8B-B14F-4D97-AF65-F5344CB8AC3E}">
-        <p14:creationId xmlns:p14="http://schemas.microsoft.com/office/powerpoint/2010/main" val="3376932600"/>
+        <p14:creationId xmlns:p14="http://schemas.microsoft.com/office/powerpoint/2010/main" val="2173809178"/>
       </p:ext>
     </p:extLst>
   </p:cSld>

</xml_diff>